<commit_message>
Testes realizados na topfunction e ppt atualizado
</commit_message>
<xml_diff>
--- a/Síntese e Pesquisa do Protocolo I2C.pptx
+++ b/Síntese e Pesquisa do Protocolo I2C.pptx
@@ -6,15 +6,10 @@
   </p:sldMasterIdLst>
   <p:sldIdLst>
     <p:sldId id="256" r:id="rId2"/>
-    <p:sldId id="257" r:id="rId3"/>
-    <p:sldId id="259" r:id="rId4"/>
-    <p:sldId id="261" r:id="rId5"/>
-    <p:sldId id="260" r:id="rId6"/>
-    <p:sldId id="262" r:id="rId7"/>
-    <p:sldId id="263" r:id="rId8"/>
-    <p:sldId id="264" r:id="rId9"/>
-    <p:sldId id="258" r:id="rId10"/>
-    <p:sldId id="265" r:id="rId11"/>
+    <p:sldId id="262" r:id="rId3"/>
+    <p:sldId id="260" r:id="rId4"/>
+    <p:sldId id="258" r:id="rId5"/>
+    <p:sldId id="265" r:id="rId6"/>
   </p:sldIdLst>
   <p:sldSz cx="12192000" cy="6858000"/>
   <p:notesSz cx="6858000" cy="9144000"/>
@@ -268,7 +263,7 @@
           <a:p>
             <a:fld id="{419BDF6B-BA06-441C-9DB4-4033FFA6C736}" type="datetimeFigureOut">
               <a:rPr lang="pt-BR" smtClean="0"/>
-              <a:t>11/10/2023</a:t>
+              <a:t>31/10/2023</a:t>
             </a:fld>
             <a:endParaRPr lang="pt-BR"/>
           </a:p>
@@ -466,7 +461,7 @@
           <a:p>
             <a:fld id="{419BDF6B-BA06-441C-9DB4-4033FFA6C736}" type="datetimeFigureOut">
               <a:rPr lang="pt-BR" smtClean="0"/>
-              <a:t>11/10/2023</a:t>
+              <a:t>31/10/2023</a:t>
             </a:fld>
             <a:endParaRPr lang="pt-BR"/>
           </a:p>
@@ -674,7 +669,7 @@
           <a:p>
             <a:fld id="{419BDF6B-BA06-441C-9DB4-4033FFA6C736}" type="datetimeFigureOut">
               <a:rPr lang="pt-BR" smtClean="0"/>
-              <a:t>11/10/2023</a:t>
+              <a:t>31/10/2023</a:t>
             </a:fld>
             <a:endParaRPr lang="pt-BR"/>
           </a:p>
@@ -872,7 +867,7 @@
           <a:p>
             <a:fld id="{419BDF6B-BA06-441C-9DB4-4033FFA6C736}" type="datetimeFigureOut">
               <a:rPr lang="pt-BR" smtClean="0"/>
-              <a:t>11/10/2023</a:t>
+              <a:t>31/10/2023</a:t>
             </a:fld>
             <a:endParaRPr lang="pt-BR"/>
           </a:p>
@@ -1147,7 +1142,7 @@
           <a:p>
             <a:fld id="{419BDF6B-BA06-441C-9DB4-4033FFA6C736}" type="datetimeFigureOut">
               <a:rPr lang="pt-BR" smtClean="0"/>
-              <a:t>11/10/2023</a:t>
+              <a:t>31/10/2023</a:t>
             </a:fld>
             <a:endParaRPr lang="pt-BR"/>
           </a:p>
@@ -1412,7 +1407,7 @@
           <a:p>
             <a:fld id="{419BDF6B-BA06-441C-9DB4-4033FFA6C736}" type="datetimeFigureOut">
               <a:rPr lang="pt-BR" smtClean="0"/>
-              <a:t>11/10/2023</a:t>
+              <a:t>31/10/2023</a:t>
             </a:fld>
             <a:endParaRPr lang="pt-BR"/>
           </a:p>
@@ -1824,7 +1819,7 @@
           <a:p>
             <a:fld id="{419BDF6B-BA06-441C-9DB4-4033FFA6C736}" type="datetimeFigureOut">
               <a:rPr lang="pt-BR" smtClean="0"/>
-              <a:t>11/10/2023</a:t>
+              <a:t>31/10/2023</a:t>
             </a:fld>
             <a:endParaRPr lang="pt-BR"/>
           </a:p>
@@ -1965,7 +1960,7 @@
           <a:p>
             <a:fld id="{419BDF6B-BA06-441C-9DB4-4033FFA6C736}" type="datetimeFigureOut">
               <a:rPr lang="pt-BR" smtClean="0"/>
-              <a:t>11/10/2023</a:t>
+              <a:t>31/10/2023</a:t>
             </a:fld>
             <a:endParaRPr lang="pt-BR"/>
           </a:p>
@@ -2078,7 +2073,7 @@
           <a:p>
             <a:fld id="{419BDF6B-BA06-441C-9DB4-4033FFA6C736}" type="datetimeFigureOut">
               <a:rPr lang="pt-BR" smtClean="0"/>
-              <a:t>11/10/2023</a:t>
+              <a:t>31/10/2023</a:t>
             </a:fld>
             <a:endParaRPr lang="pt-BR"/>
           </a:p>
@@ -2389,7 +2384,7 @@
           <a:p>
             <a:fld id="{419BDF6B-BA06-441C-9DB4-4033FFA6C736}" type="datetimeFigureOut">
               <a:rPr lang="pt-BR" smtClean="0"/>
-              <a:t>11/10/2023</a:t>
+              <a:t>31/10/2023</a:t>
             </a:fld>
             <a:endParaRPr lang="pt-BR"/>
           </a:p>
@@ -2677,7 +2672,7 @@
           <a:p>
             <a:fld id="{419BDF6B-BA06-441C-9DB4-4033FFA6C736}" type="datetimeFigureOut">
               <a:rPr lang="pt-BR" smtClean="0"/>
-              <a:t>11/10/2023</a:t>
+              <a:t>31/10/2023</a:t>
             </a:fld>
             <a:endParaRPr lang="pt-BR"/>
           </a:p>
@@ -2918,7 +2913,7 @@
           <a:p>
             <a:fld id="{419BDF6B-BA06-441C-9DB4-4033FFA6C736}" type="datetimeFigureOut">
               <a:rPr lang="pt-BR" smtClean="0"/>
-              <a:t>11/10/2023</a:t>
+              <a:t>31/10/2023</a:t>
             </a:fld>
             <a:endParaRPr lang="pt-BR"/>
           </a:p>
@@ -3544,7 +3539,7 @@
 </p:sld>
 </file>
 
-<file path=ppt/slides/slide10.xml><?xml version="1.0" encoding="utf-8"?>
+<file path=ppt/slides/slide2.xml><?xml version="1.0" encoding="utf-8"?>
 <p:sld xmlns:a="http://schemas.openxmlformats.org/drawingml/2006/main" xmlns:r="http://schemas.openxmlformats.org/officeDocument/2006/relationships" xmlns:p="http://schemas.openxmlformats.org/presentationml/2006/main">
   <p:cSld>
     <p:spTree>
@@ -3589,7 +3584,7 @@
           <a:p>
             <a:r>
               <a:rPr lang="pt-BR" dirty="0"/>
-              <a:t>Referências:</a:t>
+              <a:t>Simulações</a:t>
             </a:r>
           </a:p>
         </p:txBody>
@@ -3640,538 +3635,70 @@
           </a:p>
         </p:txBody>
       </p:sp>
-      <p:sp>
-        <p:nvSpPr>
-          <p:cNvPr id="5" name="Espaço Reservado para Conteúdo 4">
-            <a:extLst>
-              <a:ext uri="{FF2B5EF4-FFF2-40B4-BE49-F238E27FC236}">
-                <a16:creationId xmlns:a16="http://schemas.microsoft.com/office/drawing/2014/main" id="{8A6BBEBC-B091-A034-9D7F-3C332606D2AB}"/>
-              </a:ext>
-            </a:extLst>
-          </p:cNvPr>
-          <p:cNvSpPr>
-            <a:spLocks noGrp="1"/>
-          </p:cNvSpPr>
-          <p:nvPr>
-            <p:ph idx="1"/>
-          </p:nvPr>
-        </p:nvSpPr>
+      <p:pic>
+        <p:nvPicPr>
+          <p:cNvPr id="8" name="Imagem 7">
+            <a:extLst>
+              <a:ext uri="{FF2B5EF4-FFF2-40B4-BE49-F238E27FC236}">
+                <a16:creationId xmlns:a16="http://schemas.microsoft.com/office/drawing/2014/main" id="{1306C8C3-04E3-BB07-DA82-599B70188F12}"/>
+              </a:ext>
+            </a:extLst>
+          </p:cNvPr>
+          <p:cNvPicPr>
+            <a:picLocks noChangeAspect="1"/>
+          </p:cNvPicPr>
+          <p:nvPr/>
+        </p:nvPicPr>
+        <p:blipFill>
+          <a:blip r:embed="rId2"/>
+          <a:stretch>
+            <a:fillRect/>
+          </a:stretch>
+        </p:blipFill>
         <p:spPr>
           <a:xfrm>
-            <a:off x="838200" y="2325958"/>
-            <a:ext cx="10557294" cy="4351338"/>
-          </a:xfrm>
-        </p:spPr>
-        <p:txBody>
-          <a:bodyPr>
-            <a:normAutofit lnSpcReduction="10000"/>
-          </a:bodyPr>
-          <a:lstStyle/>
-          <a:p>
-            <a:pPr algn="l">
-              <a:buFont typeface="+mj-lt"/>
-              <a:buAutoNum type="arabicPeriod"/>
-            </a:pPr>
-            <a:r>
-              <a:rPr lang="pt-BR" b="0" i="0" dirty="0">
-                <a:effectLst/>
-              </a:rPr>
-              <a:t>Valdez, J., &amp; Becker, J. (2015). </a:t>
-            </a:r>
-            <a:r>
-              <a:rPr lang="pt-BR" b="0" i="0" dirty="0" err="1">
-                <a:effectLst/>
-              </a:rPr>
-              <a:t>Understanding</a:t>
-            </a:r>
-            <a:r>
-              <a:rPr lang="pt-BR" b="0" i="0" dirty="0">
-                <a:effectLst/>
-              </a:rPr>
-              <a:t> </a:t>
-            </a:r>
-            <a:r>
-              <a:rPr lang="pt-BR" b="0" i="0" dirty="0" err="1">
-                <a:effectLst/>
-              </a:rPr>
-              <a:t>the</a:t>
-            </a:r>
-            <a:r>
-              <a:rPr lang="pt-BR" b="0" i="0" dirty="0">
-                <a:effectLst/>
-              </a:rPr>
-              <a:t> I2C Bus. Local de publicação www.ti.com.</a:t>
-            </a:r>
-          </a:p>
-          <a:p>
-            <a:pPr algn="l">
-              <a:buFont typeface="+mj-lt"/>
-              <a:buAutoNum type="arabicPeriod"/>
-            </a:pPr>
-            <a:r>
-              <a:rPr lang="pt-BR" b="0" i="0" dirty="0" err="1">
-                <a:effectLst/>
-              </a:rPr>
-              <a:t>TooMuch</a:t>
-            </a:r>
-            <a:r>
-              <a:rPr lang="pt-BR" b="0" i="0" dirty="0">
-                <a:effectLst/>
-              </a:rPr>
-              <a:t> </a:t>
-            </a:r>
-            <a:r>
-              <a:rPr lang="pt-BR" b="0" i="0" dirty="0" err="1">
-                <a:effectLst/>
-              </a:rPr>
-              <a:t>Semiconductor</a:t>
-            </a:r>
-            <a:r>
-              <a:rPr lang="pt-BR" b="0" i="0" dirty="0">
-                <a:effectLst/>
-              </a:rPr>
-              <a:t> </a:t>
-            </a:r>
-            <a:r>
-              <a:rPr lang="pt-BR" b="0" i="0" dirty="0" err="1">
-                <a:effectLst/>
-              </a:rPr>
-              <a:t>Solutions</a:t>
-            </a:r>
-            <a:r>
-              <a:rPr lang="pt-BR" b="0" i="0" dirty="0">
-                <a:effectLst/>
-              </a:rPr>
-              <a:t>. (2007). I2C-Master / </a:t>
-            </a:r>
-            <a:r>
-              <a:rPr lang="pt-BR" b="0" i="0" dirty="0" err="1">
-                <a:effectLst/>
-              </a:rPr>
-              <a:t>Slave</a:t>
-            </a:r>
-            <a:r>
-              <a:rPr lang="pt-BR" b="0" i="0" dirty="0">
-                <a:effectLst/>
-              </a:rPr>
-              <a:t> Core </a:t>
-            </a:r>
-            <a:r>
-              <a:rPr lang="pt-BR" b="0" i="0" dirty="0" err="1">
-                <a:effectLst/>
-              </a:rPr>
-              <a:t>Specification</a:t>
-            </a:r>
-            <a:r>
-              <a:rPr lang="pt-BR" b="0" i="0" dirty="0">
-                <a:effectLst/>
-              </a:rPr>
-              <a:t>.</a:t>
-            </a:r>
-          </a:p>
-          <a:p>
-            <a:pPr algn="l">
-              <a:buFont typeface="+mj-lt"/>
-              <a:buAutoNum type="arabicPeriod"/>
-            </a:pPr>
-            <a:r>
-              <a:rPr lang="pt-BR" b="0" i="0" dirty="0" err="1">
-                <a:effectLst/>
-              </a:rPr>
-              <a:t>Sindhu</a:t>
-            </a:r>
-            <a:r>
-              <a:rPr lang="pt-BR" b="0" i="0" dirty="0">
-                <a:effectLst/>
-              </a:rPr>
-              <a:t>, S., A M, Dr. </a:t>
-            </a:r>
-            <a:r>
-              <a:rPr lang="pt-BR" b="0" i="0" dirty="0" err="1">
-                <a:effectLst/>
-              </a:rPr>
-              <a:t>Vijaya</a:t>
-            </a:r>
-            <a:r>
-              <a:rPr lang="pt-BR" b="0" i="0" dirty="0">
-                <a:effectLst/>
-              </a:rPr>
-              <a:t> </a:t>
-            </a:r>
-            <a:r>
-              <a:rPr lang="pt-BR" b="0" i="0" dirty="0" err="1">
-                <a:effectLst/>
-              </a:rPr>
-              <a:t>Prakash</a:t>
-            </a:r>
-            <a:r>
-              <a:rPr lang="pt-BR" b="0" i="0" dirty="0">
-                <a:effectLst/>
-              </a:rPr>
-              <a:t>, &amp; V, </a:t>
-            </a:r>
-            <a:r>
-              <a:rPr lang="pt-BR" b="0" i="0" dirty="0" err="1">
-                <a:effectLst/>
-              </a:rPr>
-              <a:t>Ankit</a:t>
-            </a:r>
-            <a:r>
-              <a:rPr lang="pt-BR" b="0" i="0" dirty="0">
-                <a:effectLst/>
-              </a:rPr>
-              <a:t> K. (2015). ASIC IMPLEMENTATION OF I2C MASTER BUS CONTROLLER FIRM IP CORE.</a:t>
-            </a:r>
-          </a:p>
-          <a:p>
-            <a:pPr algn="l">
-              <a:buFont typeface="+mj-lt"/>
-              <a:buAutoNum type="arabicPeriod"/>
-            </a:pPr>
-            <a:r>
-              <a:rPr lang="pt-BR" b="0" i="0" dirty="0" err="1">
-                <a:effectLst/>
-              </a:rPr>
-              <a:t>Tapaswi</a:t>
-            </a:r>
-            <a:r>
-              <a:rPr lang="pt-BR" b="0" i="0" dirty="0">
-                <a:effectLst/>
-              </a:rPr>
-              <a:t>, SJ, &amp; V, Dr. </a:t>
-            </a:r>
-            <a:r>
-              <a:rPr lang="pt-BR" b="0" i="0" dirty="0" err="1">
-                <a:effectLst/>
-              </a:rPr>
-              <a:t>Kiran</a:t>
-            </a:r>
-            <a:r>
-              <a:rPr lang="pt-BR" b="0" i="0" dirty="0">
-                <a:effectLst/>
-              </a:rPr>
-              <a:t>. (2021). FSM </a:t>
-            </a:r>
-            <a:r>
-              <a:rPr lang="pt-BR" b="0" i="0" dirty="0" err="1">
-                <a:effectLst/>
-              </a:rPr>
-              <a:t>implementation</a:t>
-            </a:r>
-            <a:r>
-              <a:rPr lang="pt-BR" b="0" i="0" dirty="0">
-                <a:effectLst/>
-              </a:rPr>
-              <a:t> </a:t>
-            </a:r>
-            <a:r>
-              <a:rPr lang="pt-BR" b="0" i="0" dirty="0" err="1">
-                <a:effectLst/>
-              </a:rPr>
-              <a:t>of</a:t>
-            </a:r>
-            <a:r>
-              <a:rPr lang="pt-BR" b="0" i="0" dirty="0">
-                <a:effectLst/>
-              </a:rPr>
-              <a:t> I2C </a:t>
-            </a:r>
-            <a:r>
-              <a:rPr lang="pt-BR" b="0" i="0" dirty="0" err="1">
-                <a:effectLst/>
-              </a:rPr>
-              <a:t>protocol</a:t>
-            </a:r>
-            <a:r>
-              <a:rPr lang="pt-BR" b="0" i="0" dirty="0">
-                <a:effectLst/>
-              </a:rPr>
-              <a:t> </a:t>
-            </a:r>
-            <a:r>
-              <a:rPr lang="pt-BR" b="0" i="0" dirty="0" err="1">
-                <a:effectLst/>
-              </a:rPr>
-              <a:t>and</a:t>
-            </a:r>
-            <a:r>
-              <a:rPr lang="pt-BR" b="0" i="0" dirty="0">
-                <a:effectLst/>
-              </a:rPr>
-              <a:t> its </a:t>
-            </a:r>
-            <a:r>
-              <a:rPr lang="pt-BR" b="0" i="0" dirty="0" err="1">
-                <a:effectLst/>
-              </a:rPr>
-              <a:t>verification</a:t>
-            </a:r>
-            <a:r>
-              <a:rPr lang="pt-BR" b="0" i="0" dirty="0">
-                <a:effectLst/>
-              </a:rPr>
-              <a:t> </a:t>
-            </a:r>
-            <a:r>
-              <a:rPr lang="pt-BR" b="0" i="0" dirty="0" err="1">
-                <a:effectLst/>
-              </a:rPr>
-              <a:t>using</a:t>
-            </a:r>
-            <a:r>
-              <a:rPr lang="pt-BR" b="0" i="0" dirty="0">
-                <a:effectLst/>
-              </a:rPr>
-              <a:t> </a:t>
-            </a:r>
-            <a:r>
-              <a:rPr lang="pt-BR" b="0" i="0" dirty="0" err="1">
-                <a:effectLst/>
-              </a:rPr>
-              <a:t>Verilog</a:t>
-            </a:r>
-            <a:r>
-              <a:rPr lang="pt-BR" b="0" i="0" dirty="0">
-                <a:effectLst/>
-              </a:rPr>
-              <a:t>. IJAEM.</a:t>
-            </a:r>
-          </a:p>
-          <a:p>
-            <a:pPr algn="l">
-              <a:buFont typeface="+mj-lt"/>
-              <a:buAutoNum type="arabicPeriod"/>
-            </a:pPr>
-            <a:r>
-              <a:rPr lang="pt-BR" b="0" i="0" dirty="0" err="1">
-                <a:effectLst/>
-                <a:latin typeface="Söhne"/>
-              </a:rPr>
-              <a:t>Reimer</a:t>
-            </a:r>
-            <a:r>
-              <a:rPr lang="pt-BR" b="0" i="0" dirty="0">
-                <a:effectLst/>
-                <a:latin typeface="Söhne"/>
-              </a:rPr>
-              <a:t>, C. (2020). I2C_Master. URL: </a:t>
-            </a:r>
-            <a:r>
-              <a:rPr lang="pt-BR" b="0" i="0" u="none" strike="noStrike" dirty="0">
-                <a:effectLst/>
-                <a:latin typeface="Söhne"/>
-              </a:rPr>
-              <a:t>https://github.com/chance189/I2C_Master</a:t>
-            </a:r>
-            <a:r>
-              <a:rPr lang="pt-BR" b="0" i="0" dirty="0">
-                <a:effectLst/>
-                <a:latin typeface="Söhne"/>
-              </a:rPr>
-              <a:t>.</a:t>
-            </a:r>
-            <a:endParaRPr lang="pt-BR" b="0" i="0" dirty="0">
-              <a:effectLst/>
-            </a:endParaRPr>
-          </a:p>
-        </p:txBody>
-      </p:sp>
-    </p:spTree>
-    <p:extLst>
-      <p:ext uri="{BB962C8B-B14F-4D97-AF65-F5344CB8AC3E}">
-        <p14:creationId xmlns:p14="http://schemas.microsoft.com/office/powerpoint/2010/main" val="3343184316"/>
-      </p:ext>
-    </p:extLst>
-  </p:cSld>
-  <p:clrMapOvr>
-    <a:masterClrMapping/>
-  </p:clrMapOvr>
-</p:sld>
-</file>
-
-<file path=ppt/slides/slide2.xml><?xml version="1.0" encoding="utf-8"?>
-<p:sld xmlns:a="http://schemas.openxmlformats.org/drawingml/2006/main" xmlns:r="http://schemas.openxmlformats.org/officeDocument/2006/relationships" xmlns:p="http://schemas.openxmlformats.org/presentationml/2006/main">
-  <p:cSld>
-    <p:spTree>
-      <p:nvGrpSpPr>
-        <p:cNvPr id="1" name=""/>
-        <p:cNvGrpSpPr/>
-        <p:nvPr/>
-      </p:nvGrpSpPr>
-      <p:grpSpPr>
-        <a:xfrm>
-          <a:off x="0" y="0"/>
-          <a:ext cx="0" cy="0"/>
-          <a:chOff x="0" y="0"/>
-          <a:chExt cx="0" cy="0"/>
-        </a:xfrm>
-      </p:grpSpPr>
-      <p:sp>
-        <p:nvSpPr>
-          <p:cNvPr id="2" name="Título 1">
-            <a:extLst>
-              <a:ext uri="{FF2B5EF4-FFF2-40B4-BE49-F238E27FC236}">
-                <a16:creationId xmlns:a16="http://schemas.microsoft.com/office/drawing/2014/main" id="{2082E712-2FB6-C519-58E5-190048E67FD7}"/>
-              </a:ext>
-            </a:extLst>
-          </p:cNvPr>
-          <p:cNvSpPr>
-            <a:spLocks noGrp="1"/>
-          </p:cNvSpPr>
-          <p:nvPr>
-            <p:ph type="title"/>
-          </p:nvPr>
-        </p:nvSpPr>
-        <p:spPr>
-          <a:xfrm>
-            <a:off x="0" y="18255"/>
-            <a:ext cx="10515600" cy="1325563"/>
-          </a:xfrm>
-        </p:spPr>
-        <p:txBody>
-          <a:bodyPr/>
-          <a:lstStyle/>
-          <a:p>
-            <a:r>
-              <a:rPr lang="pt-BR" dirty="0"/>
-              <a:t>Uso geral</a:t>
-            </a:r>
-          </a:p>
-        </p:txBody>
-      </p:sp>
-      <p:sp>
-        <p:nvSpPr>
-          <p:cNvPr id="3" name="Espaço Reservado para Conteúdo 2">
-            <a:extLst>
-              <a:ext uri="{FF2B5EF4-FFF2-40B4-BE49-F238E27FC236}">
-                <a16:creationId xmlns:a16="http://schemas.microsoft.com/office/drawing/2014/main" id="{5315117F-6491-ED78-9CD7-C825FE758606}"/>
-              </a:ext>
-            </a:extLst>
-          </p:cNvPr>
-          <p:cNvSpPr>
-            <a:spLocks noGrp="1"/>
-          </p:cNvSpPr>
-          <p:nvPr>
-            <p:ph idx="1"/>
-          </p:nvPr>
-        </p:nvSpPr>
-        <p:spPr>
-          <a:xfrm>
-            <a:off x="838200" y="2093044"/>
-            <a:ext cx="10515600" cy="4351338"/>
-          </a:xfrm>
-        </p:spPr>
-        <p:txBody>
-          <a:bodyPr/>
-          <a:lstStyle/>
-          <a:p>
-            <a:r>
-              <a:rPr lang="pt-BR" dirty="0"/>
-              <a:t>Comunicação entre 1 ou mais master e </a:t>
-            </a:r>
-            <a:r>
-              <a:rPr lang="pt-BR" dirty="0" err="1"/>
-              <a:t>slaves</a:t>
-            </a:r>
-            <a:r>
-              <a:rPr lang="pt-BR" dirty="0"/>
-              <a:t>.</a:t>
-            </a:r>
-          </a:p>
-          <a:p>
-            <a:pPr algn="l"/>
-            <a:endParaRPr lang="pt-BR" dirty="0"/>
-          </a:p>
-          <a:p>
-            <a:pPr algn="l"/>
-            <a:r>
-              <a:rPr lang="pt-BR" dirty="0"/>
-              <a:t>Poucos fios disponíveis (</a:t>
-            </a:r>
-            <a:r>
-              <a:rPr lang="pt-BR" b="0" i="0" u="none" strike="noStrike" baseline="0" dirty="0"/>
-              <a:t>RS232, RS422 e UART)</a:t>
-            </a:r>
-          </a:p>
-          <a:p>
-            <a:pPr algn="l"/>
-            <a:endParaRPr lang="pt-BR" dirty="0"/>
-          </a:p>
-          <a:p>
-            <a:pPr algn="l"/>
-            <a:r>
-              <a:rPr lang="pt-BR" dirty="0"/>
-              <a:t>Comunicação com sensores, monitores, aparelhos de som, </a:t>
-            </a:r>
-            <a:r>
-              <a:rPr lang="pt-BR" dirty="0" err="1"/>
-              <a:t>etc</a:t>
-            </a:r>
-            <a:endParaRPr lang="pt-BR" dirty="0"/>
-          </a:p>
-          <a:p>
-            <a:pPr algn="l"/>
-            <a:endParaRPr lang="pt-BR" dirty="0"/>
-          </a:p>
-          <a:p>
-            <a:pPr algn="l"/>
-            <a:r>
-              <a:rPr lang="pt-BR" dirty="0"/>
-              <a:t>Comunicação com memórias</a:t>
-            </a:r>
-          </a:p>
-        </p:txBody>
-      </p:sp>
-      <p:sp>
-        <p:nvSpPr>
-          <p:cNvPr id="4" name="Retângulo 3">
-            <a:extLst>
-              <a:ext uri="{FF2B5EF4-FFF2-40B4-BE49-F238E27FC236}">
-                <a16:creationId xmlns:a16="http://schemas.microsoft.com/office/drawing/2014/main" id="{48702720-20B6-0C83-76D4-2C293B89CB5B}"/>
-              </a:ext>
-            </a:extLst>
-          </p:cNvPr>
-          <p:cNvSpPr/>
-          <p:nvPr/>
-        </p:nvSpPr>
-        <p:spPr>
-          <a:xfrm>
-            <a:off x="0" y="1239028"/>
-            <a:ext cx="12192000" cy="586597"/>
+            <a:off x="5423133" y="2359323"/>
+            <a:ext cx="11" cy="1"/>
           </a:xfrm>
           <a:prstGeom prst="rect">
             <a:avLst/>
           </a:prstGeom>
         </p:spPr>
-        <p:style>
-          <a:lnRef idx="2">
-            <a:schemeClr val="accent1">
-              <a:shade val="15000"/>
-            </a:schemeClr>
-          </a:lnRef>
-          <a:fillRef idx="1">
-            <a:schemeClr val="accent1"/>
-          </a:fillRef>
-          <a:effectRef idx="0">
-            <a:schemeClr val="accent1"/>
-          </a:effectRef>
-          <a:fontRef idx="minor">
-            <a:schemeClr val="lt1"/>
-          </a:fontRef>
-        </p:style>
-        <p:txBody>
-          <a:bodyPr rtlCol="0" anchor="ctr"/>
-          <a:lstStyle/>
-          <a:p>
-            <a:pPr algn="ctr"/>
-            <a:endParaRPr lang="pt-BR"/>
-          </a:p>
-        </p:txBody>
-      </p:sp>
+      </p:pic>
+      <p:pic>
+        <p:nvPicPr>
+          <p:cNvPr id="10" name="Imagem 9">
+            <a:extLst>
+              <a:ext uri="{FF2B5EF4-FFF2-40B4-BE49-F238E27FC236}">
+                <a16:creationId xmlns:a16="http://schemas.microsoft.com/office/drawing/2014/main" id="{39EC9534-5C43-D3BC-90C5-7D8BFAF0CBD0}"/>
+              </a:ext>
+            </a:extLst>
+          </p:cNvPr>
+          <p:cNvPicPr>
+            <a:picLocks noChangeAspect="1"/>
+          </p:cNvPicPr>
+          <p:nvPr/>
+        </p:nvPicPr>
+        <p:blipFill>
+          <a:blip r:embed="rId3"/>
+          <a:stretch>
+            <a:fillRect/>
+          </a:stretch>
+        </p:blipFill>
+        <p:spPr>
+          <a:xfrm>
+            <a:off x="298450" y="1825625"/>
+            <a:ext cx="11595100" cy="4998086"/>
+          </a:xfrm>
+          <a:prstGeom prst="rect">
+            <a:avLst/>
+          </a:prstGeom>
+        </p:spPr>
+      </p:pic>
     </p:spTree>
     <p:extLst>
       <p:ext uri="{BB962C8B-B14F-4D97-AF65-F5344CB8AC3E}">
-        <p14:creationId xmlns:p14="http://schemas.microsoft.com/office/powerpoint/2010/main" val="1590998905"/>
+        <p14:creationId xmlns:p14="http://schemas.microsoft.com/office/powerpoint/2010/main" val="1664538512"/>
       </p:ext>
     </p:extLst>
   </p:cSld>
@@ -4226,112 +3753,7 @@
           <a:p>
             <a:r>
               <a:rPr lang="pt-BR" dirty="0"/>
-              <a:t>Funcionamento</a:t>
-            </a:r>
-          </a:p>
-        </p:txBody>
-      </p:sp>
-      <p:sp>
-        <p:nvSpPr>
-          <p:cNvPr id="3" name="Espaço Reservado para Conteúdo 2">
-            <a:extLst>
-              <a:ext uri="{FF2B5EF4-FFF2-40B4-BE49-F238E27FC236}">
-                <a16:creationId xmlns:a16="http://schemas.microsoft.com/office/drawing/2014/main" id="{5315117F-6491-ED78-9CD7-C825FE758606}"/>
-              </a:ext>
-            </a:extLst>
-          </p:cNvPr>
-          <p:cNvSpPr>
-            <a:spLocks noGrp="1"/>
-          </p:cNvSpPr>
-          <p:nvPr>
-            <p:ph idx="1"/>
-          </p:nvPr>
-        </p:nvSpPr>
-        <p:spPr>
-          <a:xfrm>
-            <a:off x="838200" y="2093044"/>
-            <a:ext cx="10515600" cy="4351338"/>
-          </a:xfrm>
-        </p:spPr>
-        <p:txBody>
-          <a:bodyPr>
-            <a:normAutofit lnSpcReduction="10000"/>
-          </a:bodyPr>
-          <a:lstStyle/>
-          <a:p>
-            <a:r>
-              <a:rPr lang="pt-BR" dirty="0"/>
-              <a:t>Master controla a linha SCL (serial </a:t>
-            </a:r>
-            <a:r>
-              <a:rPr lang="pt-BR" dirty="0" err="1"/>
-              <a:t>clock</a:t>
-            </a:r>
-            <a:r>
-              <a:rPr lang="pt-BR" dirty="0"/>
-              <a:t> </a:t>
-            </a:r>
-            <a:r>
-              <a:rPr lang="pt-BR" dirty="0" err="1"/>
-              <a:t>line</a:t>
-            </a:r>
-            <a:r>
-              <a:rPr lang="pt-BR" dirty="0"/>
-              <a:t>) pulsando um </a:t>
-            </a:r>
-            <a:r>
-              <a:rPr lang="pt-BR" dirty="0" err="1"/>
-              <a:t>clock</a:t>
-            </a:r>
-            <a:r>
-              <a:rPr lang="pt-BR" dirty="0"/>
-              <a:t> de sua escolha</a:t>
-            </a:r>
-          </a:p>
-          <a:p>
-            <a:endParaRPr lang="pt-BR" dirty="0"/>
-          </a:p>
-          <a:p>
-            <a:r>
-              <a:rPr lang="pt-BR" dirty="0"/>
-              <a:t>Master começa comunicação, escolhe </a:t>
-            </a:r>
-            <a:r>
-              <a:rPr lang="pt-BR" dirty="0" err="1"/>
-              <a:t>slave</a:t>
-            </a:r>
-            <a:r>
-              <a:rPr lang="pt-BR" dirty="0"/>
-              <a:t>, escolhe registrador (se houver), envia/recebe byte(s) desejados, recebe confirmação da informação e termina a comunicação</a:t>
-            </a:r>
-          </a:p>
-          <a:p>
-            <a:endParaRPr lang="pt-BR" dirty="0"/>
-          </a:p>
-          <a:p>
-            <a:r>
-              <a:rPr lang="pt-BR" dirty="0"/>
-              <a:t>Determina quem controla SDA (serial data </a:t>
-            </a:r>
-            <a:r>
-              <a:rPr lang="pt-BR" dirty="0" err="1"/>
-              <a:t>line</a:t>
-            </a:r>
-            <a:r>
-              <a:rPr lang="pt-BR" dirty="0"/>
-              <a:t>)</a:t>
-            </a:r>
-          </a:p>
-          <a:p>
-            <a:pPr marL="0" indent="0">
-              <a:buNone/>
-            </a:pPr>
-            <a:endParaRPr lang="pt-BR" dirty="0"/>
-          </a:p>
-          <a:p>
-            <a:r>
-              <a:rPr lang="pt-BR" dirty="0"/>
-              <a:t>Passos diferentes para enviar e receber informação</a:t>
+              <a:t>Simulações</a:t>
             </a:r>
           </a:p>
         </p:txBody>
@@ -4382,10 +3804,70 @@
           </a:p>
         </p:txBody>
       </p:sp>
+      <p:pic>
+        <p:nvPicPr>
+          <p:cNvPr id="8" name="Imagem 7">
+            <a:extLst>
+              <a:ext uri="{FF2B5EF4-FFF2-40B4-BE49-F238E27FC236}">
+                <a16:creationId xmlns:a16="http://schemas.microsoft.com/office/drawing/2014/main" id="{1306C8C3-04E3-BB07-DA82-599B70188F12}"/>
+              </a:ext>
+            </a:extLst>
+          </p:cNvPr>
+          <p:cNvPicPr>
+            <a:picLocks noChangeAspect="1"/>
+          </p:cNvPicPr>
+          <p:nvPr/>
+        </p:nvPicPr>
+        <p:blipFill>
+          <a:blip r:embed="rId2"/>
+          <a:stretch>
+            <a:fillRect/>
+          </a:stretch>
+        </p:blipFill>
+        <p:spPr>
+          <a:xfrm>
+            <a:off x="5423133" y="2359323"/>
+            <a:ext cx="11" cy="1"/>
+          </a:xfrm>
+          <a:prstGeom prst="rect">
+            <a:avLst/>
+          </a:prstGeom>
+        </p:spPr>
+      </p:pic>
+      <p:pic>
+        <p:nvPicPr>
+          <p:cNvPr id="7" name="Imagem 6">
+            <a:extLst>
+              <a:ext uri="{FF2B5EF4-FFF2-40B4-BE49-F238E27FC236}">
+                <a16:creationId xmlns:a16="http://schemas.microsoft.com/office/drawing/2014/main" id="{32B6A360-734A-3675-CA5D-A99473899102}"/>
+              </a:ext>
+            </a:extLst>
+          </p:cNvPr>
+          <p:cNvPicPr>
+            <a:picLocks noChangeAspect="1"/>
+          </p:cNvPicPr>
+          <p:nvPr/>
+        </p:nvPicPr>
+        <p:blipFill>
+          <a:blip r:embed="rId3"/>
+          <a:stretch>
+            <a:fillRect/>
+          </a:stretch>
+        </p:blipFill>
+        <p:spPr>
+          <a:xfrm>
+            <a:off x="0" y="2893022"/>
+            <a:ext cx="12192000" cy="3159927"/>
+          </a:xfrm>
+          <a:prstGeom prst="rect">
+            <a:avLst/>
+          </a:prstGeom>
+        </p:spPr>
+      </p:pic>
     </p:spTree>
     <p:extLst>
       <p:ext uri="{BB962C8B-B14F-4D97-AF65-F5344CB8AC3E}">
-        <p14:creationId xmlns:p14="http://schemas.microsoft.com/office/powerpoint/2010/main" val="3204631328"/>
+        <p14:creationId xmlns:p14="http://schemas.microsoft.com/office/powerpoint/2010/main" val="1887305024"/>
       </p:ext>
     </p:extLst>
   </p:cSld>
@@ -4440,7 +3922,7 @@
           <a:p>
             <a:r>
               <a:rPr lang="pt-BR" dirty="0"/>
-              <a:t>Funcionamento</a:t>
+              <a:t>Sintetização/Implementação</a:t>
             </a:r>
           </a:p>
         </p:txBody>
@@ -4493,10 +3975,10 @@
       </p:sp>
       <p:pic>
         <p:nvPicPr>
-          <p:cNvPr id="6" name="Imagem 5">
-            <a:extLst>
-              <a:ext uri="{FF2B5EF4-FFF2-40B4-BE49-F238E27FC236}">
-                <a16:creationId xmlns:a16="http://schemas.microsoft.com/office/drawing/2014/main" id="{493100CE-4DE8-F1F8-BD42-2D384FD05DFD}"/>
+          <p:cNvPr id="5" name="Imagem 4">
+            <a:extLst>
+              <a:ext uri="{FF2B5EF4-FFF2-40B4-BE49-F238E27FC236}">
+                <a16:creationId xmlns:a16="http://schemas.microsoft.com/office/drawing/2014/main" id="{DED5A071-B8A1-7C36-D4AC-E574927D5D89}"/>
               </a:ext>
             </a:extLst>
           </p:cNvPr>
@@ -4513,8 +3995,8 @@
         </p:blipFill>
         <p:spPr>
           <a:xfrm>
-            <a:off x="823192" y="2129261"/>
-            <a:ext cx="10317015" cy="2124371"/>
+            <a:off x="451751" y="2211930"/>
+            <a:ext cx="6551399" cy="4018516"/>
           </a:xfrm>
           <a:prstGeom prst="rect">
             <a:avLst/>
@@ -4523,10 +4005,10 @@
       </p:pic>
       <p:pic>
         <p:nvPicPr>
-          <p:cNvPr id="9" name="Imagem 8">
-            <a:extLst>
-              <a:ext uri="{FF2B5EF4-FFF2-40B4-BE49-F238E27FC236}">
-                <a16:creationId xmlns:a16="http://schemas.microsoft.com/office/drawing/2014/main" id="{A1A91278-2C11-3ACB-285E-3BD48E96C78A}"/>
+          <p:cNvPr id="12" name="Imagem 11">
+            <a:extLst>
+              <a:ext uri="{FF2B5EF4-FFF2-40B4-BE49-F238E27FC236}">
+                <a16:creationId xmlns:a16="http://schemas.microsoft.com/office/drawing/2014/main" id="{65B932A3-3B3C-2F60-F8D8-E79D9561A1B0}"/>
               </a:ext>
             </a:extLst>
           </p:cNvPr>
@@ -4543,8 +4025,8 @@
         </p:blipFill>
         <p:spPr>
           <a:xfrm>
-            <a:off x="394492" y="4253632"/>
-            <a:ext cx="11403016" cy="2362530"/>
+            <a:off x="8239125" y="3429000"/>
+            <a:ext cx="2276475" cy="1143000"/>
           </a:xfrm>
           <a:prstGeom prst="rect">
             <a:avLst/>
@@ -4554,7 +4036,7 @@
     </p:spTree>
     <p:extLst>
       <p:ext uri="{BB962C8B-B14F-4D97-AF65-F5344CB8AC3E}">
-        <p14:creationId xmlns:p14="http://schemas.microsoft.com/office/powerpoint/2010/main" val="680270404"/>
+        <p14:creationId xmlns:p14="http://schemas.microsoft.com/office/powerpoint/2010/main" val="3668001289"/>
       </p:ext>
     </p:extLst>
   </p:cSld>
@@ -4609,7 +4091,7 @@
           <a:p>
             <a:r>
               <a:rPr lang="pt-BR" dirty="0"/>
-              <a:t>Simulações</a:t>
+              <a:t>Referências:</a:t>
             </a:r>
           </a:p>
         </p:txBody>
@@ -4660,1075 +4142,360 @@
           </a:p>
         </p:txBody>
       </p:sp>
-      <p:pic>
-        <p:nvPicPr>
-          <p:cNvPr id="8" name="Imagem 7">
-            <a:extLst>
-              <a:ext uri="{FF2B5EF4-FFF2-40B4-BE49-F238E27FC236}">
-                <a16:creationId xmlns:a16="http://schemas.microsoft.com/office/drawing/2014/main" id="{1306C8C3-04E3-BB07-DA82-599B70188F12}"/>
-              </a:ext>
-            </a:extLst>
-          </p:cNvPr>
-          <p:cNvPicPr>
-            <a:picLocks noChangeAspect="1"/>
-          </p:cNvPicPr>
-          <p:nvPr/>
-        </p:nvPicPr>
-        <p:blipFill>
-          <a:blip r:embed="rId2"/>
-          <a:stretch>
-            <a:fillRect/>
-          </a:stretch>
-        </p:blipFill>
+      <p:sp>
+        <p:nvSpPr>
+          <p:cNvPr id="5" name="Espaço Reservado para Conteúdo 4">
+            <a:extLst>
+              <a:ext uri="{FF2B5EF4-FFF2-40B4-BE49-F238E27FC236}">
+                <a16:creationId xmlns:a16="http://schemas.microsoft.com/office/drawing/2014/main" id="{8A6BBEBC-B091-A034-9D7F-3C332606D2AB}"/>
+              </a:ext>
+            </a:extLst>
+          </p:cNvPr>
+          <p:cNvSpPr>
+            <a:spLocks noGrp="1"/>
+          </p:cNvSpPr>
+          <p:nvPr>
+            <p:ph idx="1"/>
+          </p:nvPr>
+        </p:nvSpPr>
         <p:spPr>
           <a:xfrm>
-            <a:off x="5423133" y="2359323"/>
-            <a:ext cx="11" cy="1"/>
+            <a:off x="838200" y="2325958"/>
+            <a:ext cx="10557294" cy="4351338"/>
           </a:xfrm>
-          <a:prstGeom prst="rect">
-            <a:avLst/>
-          </a:prstGeom>
         </p:spPr>
-      </p:pic>
-      <p:pic>
-        <p:nvPicPr>
-          <p:cNvPr id="12" name="Imagem 11">
-            <a:extLst>
-              <a:ext uri="{FF2B5EF4-FFF2-40B4-BE49-F238E27FC236}">
-                <a16:creationId xmlns:a16="http://schemas.microsoft.com/office/drawing/2014/main" id="{9BA780B0-63FC-1549-52A3-DD6A7F249B19}"/>
-              </a:ext>
-            </a:extLst>
-          </p:cNvPr>
-          <p:cNvPicPr>
-            <a:picLocks noChangeAspect="1"/>
-          </p:cNvPicPr>
-          <p:nvPr/>
-        </p:nvPicPr>
-        <p:blipFill>
-          <a:blip r:embed="rId3"/>
-          <a:stretch>
-            <a:fillRect/>
-          </a:stretch>
-        </p:blipFill>
-        <p:spPr>
-          <a:xfrm>
-            <a:off x="174858" y="2146302"/>
-            <a:ext cx="11712342" cy="1711324"/>
-          </a:xfrm>
-          <a:prstGeom prst="rect">
-            <a:avLst/>
-          </a:prstGeom>
-        </p:spPr>
-      </p:pic>
-      <p:pic>
-        <p:nvPicPr>
-          <p:cNvPr id="14" name="Imagem 13">
-            <a:extLst>
-              <a:ext uri="{FF2B5EF4-FFF2-40B4-BE49-F238E27FC236}">
-                <a16:creationId xmlns:a16="http://schemas.microsoft.com/office/drawing/2014/main" id="{9FAA6876-01BF-82F4-C2A5-4FF5E705D28C}"/>
-              </a:ext>
-            </a:extLst>
-          </p:cNvPr>
-          <p:cNvPicPr>
-            <a:picLocks noChangeAspect="1"/>
-          </p:cNvPicPr>
-          <p:nvPr/>
-        </p:nvPicPr>
-        <p:blipFill>
-          <a:blip r:embed="rId4"/>
-          <a:stretch>
-            <a:fillRect/>
-          </a:stretch>
-        </p:blipFill>
-        <p:spPr>
-          <a:xfrm>
-            <a:off x="57150" y="4638675"/>
-            <a:ext cx="12077700" cy="1314450"/>
-          </a:xfrm>
-          <a:prstGeom prst="rect">
-            <a:avLst/>
-          </a:prstGeom>
-        </p:spPr>
-      </p:pic>
-      <p:sp>
-        <p:nvSpPr>
-          <p:cNvPr id="16" name="CaixaDeTexto 15">
-            <a:extLst>
-              <a:ext uri="{FF2B5EF4-FFF2-40B4-BE49-F238E27FC236}">
-                <a16:creationId xmlns:a16="http://schemas.microsoft.com/office/drawing/2014/main" id="{5714990D-C325-5B31-B41F-D43734782F6B}"/>
-              </a:ext>
-            </a:extLst>
-          </p:cNvPr>
-          <p:cNvSpPr txBox="1"/>
-          <p:nvPr/>
-        </p:nvSpPr>
-        <p:spPr>
-          <a:xfrm>
-            <a:off x="174858" y="3993637"/>
-            <a:ext cx="6223958" cy="369332"/>
-          </a:xfrm>
-          <a:prstGeom prst="rect">
-            <a:avLst/>
-          </a:prstGeom>
-          <a:noFill/>
-        </p:spPr>
-        <p:txBody>
-          <a:bodyPr wrap="square">
-            <a:spAutoFit/>
+        <p:txBody>
+          <a:bodyPr>
+            <a:normAutofit lnSpcReduction="10000"/>
           </a:bodyPr>
           <a:lstStyle/>
           <a:p>
-            <a:r>
-              <a:rPr lang="pt-BR" dirty="0"/>
-              <a:t>SLAVE ADDR: 10010110</a:t>
-            </a:r>
-          </a:p>
-        </p:txBody>
-      </p:sp>
-      <p:sp>
-        <p:nvSpPr>
-          <p:cNvPr id="18" name="CaixaDeTexto 17">
-            <a:extLst>
-              <a:ext uri="{FF2B5EF4-FFF2-40B4-BE49-F238E27FC236}">
-                <a16:creationId xmlns:a16="http://schemas.microsoft.com/office/drawing/2014/main" id="{492F9E5A-B446-AF4E-613B-AC769AF3F540}"/>
-              </a:ext>
-            </a:extLst>
-          </p:cNvPr>
-          <p:cNvSpPr txBox="1"/>
-          <p:nvPr/>
-        </p:nvSpPr>
-        <p:spPr>
-          <a:xfrm>
-            <a:off x="174858" y="5953125"/>
-            <a:ext cx="6223958" cy="369332"/>
-          </a:xfrm>
-          <a:prstGeom prst="rect">
-            <a:avLst/>
-          </a:prstGeom>
-          <a:noFill/>
-        </p:spPr>
-        <p:txBody>
-          <a:bodyPr wrap="square">
-            <a:spAutoFit/>
-          </a:bodyPr>
-          <a:lstStyle/>
-          <a:p>
-            <a:r>
-              <a:rPr lang="pt-BR" dirty="0" err="1"/>
-              <a:t>Reg</a:t>
-            </a:r>
-            <a:r>
-              <a:rPr lang="pt-BR" dirty="0"/>
+            <a:pPr algn="l">
+              <a:buFont typeface="+mj-lt"/>
+              <a:buAutoNum type="arabicPeriod"/>
+            </a:pPr>
+            <a:r>
+              <a:rPr lang="pt-BR" b="0" i="0" dirty="0">
+                <a:effectLst/>
+              </a:rPr>
+              <a:t>Valdez, J., &amp; Becker, J. (2015). </a:t>
+            </a:r>
+            <a:r>
+              <a:rPr lang="pt-BR" b="0" i="0" dirty="0" err="1">
+                <a:effectLst/>
+              </a:rPr>
+              <a:t>Understanding</a:t>
+            </a:r>
+            <a:r>
+              <a:rPr lang="pt-BR" b="0" i="0" dirty="0">
+                <a:effectLst/>
+              </a:rPr>
               <a:t> </a:t>
             </a:r>
             <a:r>
-              <a:rPr lang="pt-BR" dirty="0" err="1"/>
-              <a:t>Addr</a:t>
-            </a:r>
-            <a:r>
-              <a:rPr lang="pt-BR" dirty="0"/>
-              <a:t> : 00101110</a:t>
-            </a:r>
+              <a:rPr lang="pt-BR" b="0" i="0" dirty="0" err="1">
+                <a:effectLst/>
+              </a:rPr>
+              <a:t>the</a:t>
+            </a:r>
+            <a:r>
+              <a:rPr lang="pt-BR" b="0" i="0" dirty="0">
+                <a:effectLst/>
+              </a:rPr>
+              <a:t> I2C Bus. Local de publicação www.ti.com.</a:t>
+            </a:r>
+          </a:p>
+          <a:p>
+            <a:pPr algn="l">
+              <a:buFont typeface="+mj-lt"/>
+              <a:buAutoNum type="arabicPeriod"/>
+            </a:pPr>
+            <a:r>
+              <a:rPr lang="pt-BR" b="0" i="0" dirty="0" err="1">
+                <a:effectLst/>
+              </a:rPr>
+              <a:t>TooMuch</a:t>
+            </a:r>
+            <a:r>
+              <a:rPr lang="pt-BR" b="0" i="0" dirty="0">
+                <a:effectLst/>
+              </a:rPr>
+              <a:t> </a:t>
+            </a:r>
+            <a:r>
+              <a:rPr lang="pt-BR" b="0" i="0" dirty="0" err="1">
+                <a:effectLst/>
+              </a:rPr>
+              <a:t>Semiconductor</a:t>
+            </a:r>
+            <a:r>
+              <a:rPr lang="pt-BR" b="0" i="0" dirty="0">
+                <a:effectLst/>
+              </a:rPr>
+              <a:t> </a:t>
+            </a:r>
+            <a:r>
+              <a:rPr lang="pt-BR" b="0" i="0" dirty="0" err="1">
+                <a:effectLst/>
+              </a:rPr>
+              <a:t>Solutions</a:t>
+            </a:r>
+            <a:r>
+              <a:rPr lang="pt-BR" b="0" i="0" dirty="0">
+                <a:effectLst/>
+              </a:rPr>
+              <a:t>. (2007). I2C-Master / </a:t>
+            </a:r>
+            <a:r>
+              <a:rPr lang="pt-BR" b="0" i="0" dirty="0" err="1">
+                <a:effectLst/>
+              </a:rPr>
+              <a:t>Slave</a:t>
+            </a:r>
+            <a:r>
+              <a:rPr lang="pt-BR" b="0" i="0" dirty="0">
+                <a:effectLst/>
+              </a:rPr>
+              <a:t> Core </a:t>
+            </a:r>
+            <a:r>
+              <a:rPr lang="pt-BR" b="0" i="0" dirty="0" err="1">
+                <a:effectLst/>
+              </a:rPr>
+              <a:t>Specification</a:t>
+            </a:r>
+            <a:r>
+              <a:rPr lang="pt-BR" b="0" i="0" dirty="0">
+                <a:effectLst/>
+              </a:rPr>
+              <a:t>.</a:t>
+            </a:r>
+          </a:p>
+          <a:p>
+            <a:pPr algn="l">
+              <a:buFont typeface="+mj-lt"/>
+              <a:buAutoNum type="arabicPeriod"/>
+            </a:pPr>
+            <a:r>
+              <a:rPr lang="pt-BR" b="0" i="0" dirty="0" err="1">
+                <a:effectLst/>
+              </a:rPr>
+              <a:t>Sindhu</a:t>
+            </a:r>
+            <a:r>
+              <a:rPr lang="pt-BR" b="0" i="0" dirty="0">
+                <a:effectLst/>
+              </a:rPr>
+              <a:t>, S., A M, Dr. </a:t>
+            </a:r>
+            <a:r>
+              <a:rPr lang="pt-BR" b="0" i="0" dirty="0" err="1">
+                <a:effectLst/>
+              </a:rPr>
+              <a:t>Vijaya</a:t>
+            </a:r>
+            <a:r>
+              <a:rPr lang="pt-BR" b="0" i="0" dirty="0">
+                <a:effectLst/>
+              </a:rPr>
+              <a:t> </a:t>
+            </a:r>
+            <a:r>
+              <a:rPr lang="pt-BR" b="0" i="0" dirty="0" err="1">
+                <a:effectLst/>
+              </a:rPr>
+              <a:t>Prakash</a:t>
+            </a:r>
+            <a:r>
+              <a:rPr lang="pt-BR" b="0" i="0" dirty="0">
+                <a:effectLst/>
+              </a:rPr>
+              <a:t>, &amp; V, </a:t>
+            </a:r>
+            <a:r>
+              <a:rPr lang="pt-BR" b="0" i="0" dirty="0" err="1">
+                <a:effectLst/>
+              </a:rPr>
+              <a:t>Ankit</a:t>
+            </a:r>
+            <a:r>
+              <a:rPr lang="pt-BR" b="0" i="0" dirty="0">
+                <a:effectLst/>
+              </a:rPr>
+              <a:t> K. (2015). ASIC IMPLEMENTATION OF I2C MASTER BUS CONTROLLER FIRM IP CORE.</a:t>
+            </a:r>
+          </a:p>
+          <a:p>
+            <a:pPr algn="l">
+              <a:buFont typeface="+mj-lt"/>
+              <a:buAutoNum type="arabicPeriod"/>
+            </a:pPr>
+            <a:r>
+              <a:rPr lang="pt-BR" b="0" i="0" dirty="0" err="1">
+                <a:effectLst/>
+              </a:rPr>
+              <a:t>Tapaswi</a:t>
+            </a:r>
+            <a:r>
+              <a:rPr lang="pt-BR" b="0" i="0" dirty="0">
+                <a:effectLst/>
+              </a:rPr>
+              <a:t>, SJ, &amp; V, Dr. </a:t>
+            </a:r>
+            <a:r>
+              <a:rPr lang="pt-BR" b="0" i="0" dirty="0" err="1">
+                <a:effectLst/>
+              </a:rPr>
+              <a:t>Kiran</a:t>
+            </a:r>
+            <a:r>
+              <a:rPr lang="pt-BR" b="0" i="0" dirty="0">
+                <a:effectLst/>
+              </a:rPr>
+              <a:t>. (2021). FSM </a:t>
+            </a:r>
+            <a:r>
+              <a:rPr lang="pt-BR" b="0" i="0" dirty="0" err="1">
+                <a:effectLst/>
+              </a:rPr>
+              <a:t>implementation</a:t>
+            </a:r>
+            <a:r>
+              <a:rPr lang="pt-BR" b="0" i="0" dirty="0">
+                <a:effectLst/>
+              </a:rPr>
+              <a:t> </a:t>
+            </a:r>
+            <a:r>
+              <a:rPr lang="pt-BR" b="0" i="0" dirty="0" err="1">
+                <a:effectLst/>
+              </a:rPr>
+              <a:t>of</a:t>
+            </a:r>
+            <a:r>
+              <a:rPr lang="pt-BR" b="0" i="0" dirty="0">
+                <a:effectLst/>
+              </a:rPr>
+              <a:t> I2C </a:t>
+            </a:r>
+            <a:r>
+              <a:rPr lang="pt-BR" b="0" i="0" dirty="0" err="1">
+                <a:effectLst/>
+              </a:rPr>
+              <a:t>protocol</a:t>
+            </a:r>
+            <a:r>
+              <a:rPr lang="pt-BR" b="0" i="0" dirty="0">
+                <a:effectLst/>
+              </a:rPr>
+              <a:t> </a:t>
+            </a:r>
+            <a:r>
+              <a:rPr lang="pt-BR" b="0" i="0" dirty="0" err="1">
+                <a:effectLst/>
+              </a:rPr>
+              <a:t>and</a:t>
+            </a:r>
+            <a:r>
+              <a:rPr lang="pt-BR" b="0" i="0" dirty="0">
+                <a:effectLst/>
+              </a:rPr>
+              <a:t> its </a:t>
+            </a:r>
+            <a:r>
+              <a:rPr lang="pt-BR" b="0" i="0" dirty="0" err="1">
+                <a:effectLst/>
+              </a:rPr>
+              <a:t>verification</a:t>
+            </a:r>
+            <a:r>
+              <a:rPr lang="pt-BR" b="0" i="0" dirty="0">
+                <a:effectLst/>
+              </a:rPr>
+              <a:t> </a:t>
+            </a:r>
+            <a:r>
+              <a:rPr lang="pt-BR" b="0" i="0" dirty="0" err="1">
+                <a:effectLst/>
+              </a:rPr>
+              <a:t>using</a:t>
+            </a:r>
+            <a:r>
+              <a:rPr lang="pt-BR" b="0" i="0" dirty="0">
+                <a:effectLst/>
+              </a:rPr>
+              <a:t> </a:t>
+            </a:r>
+            <a:r>
+              <a:rPr lang="pt-BR" b="0" i="0" dirty="0" err="1">
+                <a:effectLst/>
+              </a:rPr>
+              <a:t>Verilog</a:t>
+            </a:r>
+            <a:r>
+              <a:rPr lang="pt-BR" b="0" i="0" dirty="0">
+                <a:effectLst/>
+              </a:rPr>
+              <a:t>. IJAEM.</a:t>
+            </a:r>
+          </a:p>
+          <a:p>
+            <a:pPr algn="l">
+              <a:buFont typeface="+mj-lt"/>
+              <a:buAutoNum type="arabicPeriod"/>
+            </a:pPr>
+            <a:r>
+              <a:rPr lang="pt-BR" b="0" i="0" dirty="0" err="1">
+                <a:effectLst/>
+                <a:latin typeface="Söhne"/>
+              </a:rPr>
+              <a:t>Thirion</a:t>
+            </a:r>
+            <a:r>
+              <a:rPr lang="pt-BR" b="0" i="0" dirty="0">
+                <a:effectLst/>
+                <a:latin typeface="Söhne"/>
+              </a:rPr>
+              <a:t>, P. (2016). vhdI2CMaster. URL: </a:t>
+            </a:r>
+            <a:r>
+              <a:rPr lang="pt-BR" b="0" i="0" u="none" strike="noStrike" dirty="0">
+                <a:effectLst/>
+                <a:latin typeface="Söhne"/>
+              </a:rPr>
+              <a:t>https://github.com/</a:t>
+            </a:r>
+            <a:r>
+              <a:rPr lang="pt-BR" b="0" i="0" u="none" strike="noStrike" dirty="0" err="1">
+                <a:effectLst/>
+                <a:latin typeface="Söhne"/>
+              </a:rPr>
+              <a:t>tirfil</a:t>
+            </a:r>
+            <a:r>
+              <a:rPr lang="pt-BR" b="0" i="0" u="none" strike="noStrike" dirty="0">
+                <a:effectLst/>
+                <a:latin typeface="Söhne"/>
+              </a:rPr>
+              <a:t>/vhdI2CMaster</a:t>
+            </a:r>
+            <a:r>
+              <a:rPr lang="pt-BR" b="0" i="0" dirty="0">
+                <a:effectLst/>
+                <a:latin typeface="Söhne"/>
+              </a:rPr>
+              <a:t>.</a:t>
+            </a:r>
+            <a:endParaRPr lang="pt-BR" b="0" i="0" dirty="0">
+              <a:effectLst/>
+            </a:endParaRPr>
           </a:p>
         </p:txBody>
       </p:sp>
     </p:spTree>
     <p:extLst>
       <p:ext uri="{BB962C8B-B14F-4D97-AF65-F5344CB8AC3E}">
-        <p14:creationId xmlns:p14="http://schemas.microsoft.com/office/powerpoint/2010/main" val="1887305024"/>
-      </p:ext>
-    </p:extLst>
-  </p:cSld>
-  <p:clrMapOvr>
-    <a:masterClrMapping/>
-  </p:clrMapOvr>
-</p:sld>
-</file>
-
-<file path=ppt/slides/slide6.xml><?xml version="1.0" encoding="utf-8"?>
-<p:sld xmlns:a="http://schemas.openxmlformats.org/drawingml/2006/main" xmlns:r="http://schemas.openxmlformats.org/officeDocument/2006/relationships" xmlns:p="http://schemas.openxmlformats.org/presentationml/2006/main">
-  <p:cSld>
-    <p:spTree>
-      <p:nvGrpSpPr>
-        <p:cNvPr id="1" name=""/>
-        <p:cNvGrpSpPr/>
-        <p:nvPr/>
-      </p:nvGrpSpPr>
-      <p:grpSpPr>
-        <a:xfrm>
-          <a:off x="0" y="0"/>
-          <a:ext cx="0" cy="0"/>
-          <a:chOff x="0" y="0"/>
-          <a:chExt cx="0" cy="0"/>
-        </a:xfrm>
-      </p:grpSpPr>
-      <p:sp>
-        <p:nvSpPr>
-          <p:cNvPr id="2" name="Título 1">
-            <a:extLst>
-              <a:ext uri="{FF2B5EF4-FFF2-40B4-BE49-F238E27FC236}">
-                <a16:creationId xmlns:a16="http://schemas.microsoft.com/office/drawing/2014/main" id="{2082E712-2FB6-C519-58E5-190048E67FD7}"/>
-              </a:ext>
-            </a:extLst>
-          </p:cNvPr>
-          <p:cNvSpPr>
-            <a:spLocks noGrp="1"/>
-          </p:cNvSpPr>
-          <p:nvPr>
-            <p:ph type="title"/>
-          </p:nvPr>
-        </p:nvSpPr>
-        <p:spPr>
-          <a:xfrm>
-            <a:off x="0" y="18255"/>
-            <a:ext cx="10515600" cy="1325563"/>
-          </a:xfrm>
-        </p:spPr>
-        <p:txBody>
-          <a:bodyPr/>
-          <a:lstStyle/>
-          <a:p>
-            <a:r>
-              <a:rPr lang="pt-BR" dirty="0"/>
-              <a:t>Simulações</a:t>
-            </a:r>
-          </a:p>
-        </p:txBody>
-      </p:sp>
-      <p:sp>
-        <p:nvSpPr>
-          <p:cNvPr id="4" name="Retângulo 3">
-            <a:extLst>
-              <a:ext uri="{FF2B5EF4-FFF2-40B4-BE49-F238E27FC236}">
-                <a16:creationId xmlns:a16="http://schemas.microsoft.com/office/drawing/2014/main" id="{48702720-20B6-0C83-76D4-2C293B89CB5B}"/>
-              </a:ext>
-            </a:extLst>
-          </p:cNvPr>
-          <p:cNvSpPr/>
-          <p:nvPr/>
-        </p:nvSpPr>
-        <p:spPr>
-          <a:xfrm>
-            <a:off x="0" y="1239028"/>
-            <a:ext cx="12192000" cy="586597"/>
-          </a:xfrm>
-          <a:prstGeom prst="rect">
-            <a:avLst/>
-          </a:prstGeom>
-        </p:spPr>
-        <p:style>
-          <a:lnRef idx="2">
-            <a:schemeClr val="accent1">
-              <a:shade val="15000"/>
-            </a:schemeClr>
-          </a:lnRef>
-          <a:fillRef idx="1">
-            <a:schemeClr val="accent1"/>
-          </a:fillRef>
-          <a:effectRef idx="0">
-            <a:schemeClr val="accent1"/>
-          </a:effectRef>
-          <a:fontRef idx="minor">
-            <a:schemeClr val="lt1"/>
-          </a:fontRef>
-        </p:style>
-        <p:txBody>
-          <a:bodyPr rtlCol="0" anchor="ctr"/>
-          <a:lstStyle/>
-          <a:p>
-            <a:pPr algn="ctr"/>
-            <a:endParaRPr lang="pt-BR"/>
-          </a:p>
-        </p:txBody>
-      </p:sp>
-      <p:pic>
-        <p:nvPicPr>
-          <p:cNvPr id="8" name="Imagem 7">
-            <a:extLst>
-              <a:ext uri="{FF2B5EF4-FFF2-40B4-BE49-F238E27FC236}">
-                <a16:creationId xmlns:a16="http://schemas.microsoft.com/office/drawing/2014/main" id="{1306C8C3-04E3-BB07-DA82-599B70188F12}"/>
-              </a:ext>
-            </a:extLst>
-          </p:cNvPr>
-          <p:cNvPicPr>
-            <a:picLocks noChangeAspect="1"/>
-          </p:cNvPicPr>
-          <p:nvPr/>
-        </p:nvPicPr>
-        <p:blipFill>
-          <a:blip r:embed="rId2"/>
-          <a:stretch>
-            <a:fillRect/>
-          </a:stretch>
-        </p:blipFill>
-        <p:spPr>
-          <a:xfrm>
-            <a:off x="5423133" y="2359323"/>
-            <a:ext cx="11" cy="1"/>
-          </a:xfrm>
-          <a:prstGeom prst="rect">
-            <a:avLst/>
-          </a:prstGeom>
-        </p:spPr>
-      </p:pic>
-      <p:pic>
-        <p:nvPicPr>
-          <p:cNvPr id="5" name="Imagem 4">
-            <a:extLst>
-              <a:ext uri="{FF2B5EF4-FFF2-40B4-BE49-F238E27FC236}">
-                <a16:creationId xmlns:a16="http://schemas.microsoft.com/office/drawing/2014/main" id="{DAD8B9CD-C145-7DAA-8524-19CADF81D3EC}"/>
-              </a:ext>
-            </a:extLst>
-          </p:cNvPr>
-          <p:cNvPicPr>
-            <a:picLocks noChangeAspect="1"/>
-          </p:cNvPicPr>
-          <p:nvPr/>
-        </p:nvPicPr>
-        <p:blipFill>
-          <a:blip r:embed="rId3"/>
-          <a:stretch>
-            <a:fillRect/>
-          </a:stretch>
-        </p:blipFill>
-        <p:spPr>
-          <a:xfrm>
-            <a:off x="-12" y="3337702"/>
-            <a:ext cx="12011015" cy="2038351"/>
-          </a:xfrm>
-          <a:prstGeom prst="rect">
-            <a:avLst/>
-          </a:prstGeom>
-        </p:spPr>
-      </p:pic>
-      <p:sp>
-        <p:nvSpPr>
-          <p:cNvPr id="7" name="CaixaDeTexto 6">
-            <a:extLst>
-              <a:ext uri="{FF2B5EF4-FFF2-40B4-BE49-F238E27FC236}">
-                <a16:creationId xmlns:a16="http://schemas.microsoft.com/office/drawing/2014/main" id="{06F5C324-6C9E-B2E7-FAB6-211A28B12522}"/>
-              </a:ext>
-            </a:extLst>
-          </p:cNvPr>
-          <p:cNvSpPr txBox="1"/>
-          <p:nvPr/>
-        </p:nvSpPr>
-        <p:spPr>
-          <a:xfrm>
-            <a:off x="153119" y="5618972"/>
-            <a:ext cx="6223958" cy="369332"/>
-          </a:xfrm>
-          <a:prstGeom prst="rect">
-            <a:avLst/>
-          </a:prstGeom>
-          <a:noFill/>
-        </p:spPr>
-        <p:txBody>
-          <a:bodyPr wrap="square">
-            <a:spAutoFit/>
-          </a:bodyPr>
-          <a:lstStyle/>
-          <a:p>
-            <a:r>
-              <a:rPr lang="pt-BR" dirty="0"/>
-              <a:t>Data </a:t>
-            </a:r>
-            <a:r>
-              <a:rPr lang="pt-BR" dirty="0" err="1"/>
-              <a:t>written</a:t>
-            </a:r>
-            <a:r>
-              <a:rPr lang="pt-BR" dirty="0"/>
-              <a:t>: 00000111</a:t>
-            </a:r>
-          </a:p>
-        </p:txBody>
-      </p:sp>
-    </p:spTree>
-    <p:extLst>
-      <p:ext uri="{BB962C8B-B14F-4D97-AF65-F5344CB8AC3E}">
-        <p14:creationId xmlns:p14="http://schemas.microsoft.com/office/powerpoint/2010/main" val="1664538512"/>
-      </p:ext>
-    </p:extLst>
-  </p:cSld>
-  <p:clrMapOvr>
-    <a:masterClrMapping/>
-  </p:clrMapOvr>
-</p:sld>
-</file>
-
-<file path=ppt/slides/slide7.xml><?xml version="1.0" encoding="utf-8"?>
-<p:sld xmlns:a="http://schemas.openxmlformats.org/drawingml/2006/main" xmlns:r="http://schemas.openxmlformats.org/officeDocument/2006/relationships" xmlns:p="http://schemas.openxmlformats.org/presentationml/2006/main">
-  <p:cSld>
-    <p:spTree>
-      <p:nvGrpSpPr>
-        <p:cNvPr id="1" name=""/>
-        <p:cNvGrpSpPr/>
-        <p:nvPr/>
-      </p:nvGrpSpPr>
-      <p:grpSpPr>
-        <a:xfrm>
-          <a:off x="0" y="0"/>
-          <a:ext cx="0" cy="0"/>
-          <a:chOff x="0" y="0"/>
-          <a:chExt cx="0" cy="0"/>
-        </a:xfrm>
-      </p:grpSpPr>
-      <p:sp>
-        <p:nvSpPr>
-          <p:cNvPr id="2" name="Título 1">
-            <a:extLst>
-              <a:ext uri="{FF2B5EF4-FFF2-40B4-BE49-F238E27FC236}">
-                <a16:creationId xmlns:a16="http://schemas.microsoft.com/office/drawing/2014/main" id="{2082E712-2FB6-C519-58E5-190048E67FD7}"/>
-              </a:ext>
-            </a:extLst>
-          </p:cNvPr>
-          <p:cNvSpPr>
-            <a:spLocks noGrp="1"/>
-          </p:cNvSpPr>
-          <p:nvPr>
-            <p:ph type="title"/>
-          </p:nvPr>
-        </p:nvSpPr>
-        <p:spPr>
-          <a:xfrm>
-            <a:off x="0" y="18255"/>
-            <a:ext cx="10515600" cy="1325563"/>
-          </a:xfrm>
-        </p:spPr>
-        <p:txBody>
-          <a:bodyPr/>
-          <a:lstStyle/>
-          <a:p>
-            <a:r>
-              <a:rPr lang="pt-BR" dirty="0"/>
-              <a:t>Simulações</a:t>
-            </a:r>
-          </a:p>
-        </p:txBody>
-      </p:sp>
-      <p:sp>
-        <p:nvSpPr>
-          <p:cNvPr id="4" name="Retângulo 3">
-            <a:extLst>
-              <a:ext uri="{FF2B5EF4-FFF2-40B4-BE49-F238E27FC236}">
-                <a16:creationId xmlns:a16="http://schemas.microsoft.com/office/drawing/2014/main" id="{48702720-20B6-0C83-76D4-2C293B89CB5B}"/>
-              </a:ext>
-            </a:extLst>
-          </p:cNvPr>
-          <p:cNvSpPr/>
-          <p:nvPr/>
-        </p:nvSpPr>
-        <p:spPr>
-          <a:xfrm>
-            <a:off x="0" y="1239028"/>
-            <a:ext cx="12192000" cy="586597"/>
-          </a:xfrm>
-          <a:prstGeom prst="rect">
-            <a:avLst/>
-          </a:prstGeom>
-        </p:spPr>
-        <p:style>
-          <a:lnRef idx="2">
-            <a:schemeClr val="accent1">
-              <a:shade val="15000"/>
-            </a:schemeClr>
-          </a:lnRef>
-          <a:fillRef idx="1">
-            <a:schemeClr val="accent1"/>
-          </a:fillRef>
-          <a:effectRef idx="0">
-            <a:schemeClr val="accent1"/>
-          </a:effectRef>
-          <a:fontRef idx="minor">
-            <a:schemeClr val="lt1"/>
-          </a:fontRef>
-        </p:style>
-        <p:txBody>
-          <a:bodyPr rtlCol="0" anchor="ctr"/>
-          <a:lstStyle/>
-          <a:p>
-            <a:pPr algn="ctr"/>
-            <a:endParaRPr lang="pt-BR"/>
-          </a:p>
-        </p:txBody>
-      </p:sp>
-      <p:pic>
-        <p:nvPicPr>
-          <p:cNvPr id="8" name="Imagem 7">
-            <a:extLst>
-              <a:ext uri="{FF2B5EF4-FFF2-40B4-BE49-F238E27FC236}">
-                <a16:creationId xmlns:a16="http://schemas.microsoft.com/office/drawing/2014/main" id="{1306C8C3-04E3-BB07-DA82-599B70188F12}"/>
-              </a:ext>
-            </a:extLst>
-          </p:cNvPr>
-          <p:cNvPicPr>
-            <a:picLocks noChangeAspect="1"/>
-          </p:cNvPicPr>
-          <p:nvPr/>
-        </p:nvPicPr>
-        <p:blipFill>
-          <a:blip r:embed="rId2"/>
-          <a:stretch>
-            <a:fillRect/>
-          </a:stretch>
-        </p:blipFill>
-        <p:spPr>
-          <a:xfrm>
-            <a:off x="5423133" y="2359323"/>
-            <a:ext cx="11" cy="1"/>
-          </a:xfrm>
-          <a:prstGeom prst="rect">
-            <a:avLst/>
-          </a:prstGeom>
-        </p:spPr>
-      </p:pic>
-      <p:pic>
-        <p:nvPicPr>
-          <p:cNvPr id="12" name="Imagem 11">
-            <a:extLst>
-              <a:ext uri="{FF2B5EF4-FFF2-40B4-BE49-F238E27FC236}">
-                <a16:creationId xmlns:a16="http://schemas.microsoft.com/office/drawing/2014/main" id="{9BA780B0-63FC-1549-52A3-DD6A7F249B19}"/>
-              </a:ext>
-            </a:extLst>
-          </p:cNvPr>
-          <p:cNvPicPr>
-            <a:picLocks noChangeAspect="1"/>
-          </p:cNvPicPr>
-          <p:nvPr/>
-        </p:nvPicPr>
-        <p:blipFill>
-          <a:blip r:embed="rId3"/>
-          <a:stretch>
-            <a:fillRect/>
-          </a:stretch>
-        </p:blipFill>
-        <p:spPr>
-          <a:xfrm>
-            <a:off x="174858" y="2146302"/>
-            <a:ext cx="11712342" cy="1711324"/>
-          </a:xfrm>
-          <a:prstGeom prst="rect">
-            <a:avLst/>
-          </a:prstGeom>
-        </p:spPr>
-      </p:pic>
-      <p:pic>
-        <p:nvPicPr>
-          <p:cNvPr id="14" name="Imagem 13">
-            <a:extLst>
-              <a:ext uri="{FF2B5EF4-FFF2-40B4-BE49-F238E27FC236}">
-                <a16:creationId xmlns:a16="http://schemas.microsoft.com/office/drawing/2014/main" id="{9FAA6876-01BF-82F4-C2A5-4FF5E705D28C}"/>
-              </a:ext>
-            </a:extLst>
-          </p:cNvPr>
-          <p:cNvPicPr>
-            <a:picLocks noChangeAspect="1"/>
-          </p:cNvPicPr>
-          <p:nvPr/>
-        </p:nvPicPr>
-        <p:blipFill>
-          <a:blip r:embed="rId4"/>
-          <a:stretch>
-            <a:fillRect/>
-          </a:stretch>
-        </p:blipFill>
-        <p:spPr>
-          <a:xfrm>
-            <a:off x="57150" y="4638675"/>
-            <a:ext cx="12077700" cy="1314450"/>
-          </a:xfrm>
-          <a:prstGeom prst="rect">
-            <a:avLst/>
-          </a:prstGeom>
-        </p:spPr>
-      </p:pic>
-    </p:spTree>
-    <p:extLst>
-      <p:ext uri="{BB962C8B-B14F-4D97-AF65-F5344CB8AC3E}">
-        <p14:creationId xmlns:p14="http://schemas.microsoft.com/office/powerpoint/2010/main" val="730392748"/>
-      </p:ext>
-    </p:extLst>
-  </p:cSld>
-  <p:clrMapOvr>
-    <a:masterClrMapping/>
-  </p:clrMapOvr>
-</p:sld>
-</file>
-
-<file path=ppt/slides/slide8.xml><?xml version="1.0" encoding="utf-8"?>
-<p:sld xmlns:a="http://schemas.openxmlformats.org/drawingml/2006/main" xmlns:r="http://schemas.openxmlformats.org/officeDocument/2006/relationships" xmlns:p="http://schemas.openxmlformats.org/presentationml/2006/main">
-  <p:cSld>
-    <p:spTree>
-      <p:nvGrpSpPr>
-        <p:cNvPr id="1" name=""/>
-        <p:cNvGrpSpPr/>
-        <p:nvPr/>
-      </p:nvGrpSpPr>
-      <p:grpSpPr>
-        <a:xfrm>
-          <a:off x="0" y="0"/>
-          <a:ext cx="0" cy="0"/>
-          <a:chOff x="0" y="0"/>
-          <a:chExt cx="0" cy="0"/>
-        </a:xfrm>
-      </p:grpSpPr>
-      <p:sp>
-        <p:nvSpPr>
-          <p:cNvPr id="2" name="Título 1">
-            <a:extLst>
-              <a:ext uri="{FF2B5EF4-FFF2-40B4-BE49-F238E27FC236}">
-                <a16:creationId xmlns:a16="http://schemas.microsoft.com/office/drawing/2014/main" id="{2082E712-2FB6-C519-58E5-190048E67FD7}"/>
-              </a:ext>
-            </a:extLst>
-          </p:cNvPr>
-          <p:cNvSpPr>
-            <a:spLocks noGrp="1"/>
-          </p:cNvSpPr>
-          <p:nvPr>
-            <p:ph type="title"/>
-          </p:nvPr>
-        </p:nvSpPr>
-        <p:spPr>
-          <a:xfrm>
-            <a:off x="0" y="18255"/>
-            <a:ext cx="10515600" cy="1325563"/>
-          </a:xfrm>
-        </p:spPr>
-        <p:txBody>
-          <a:bodyPr/>
-          <a:lstStyle/>
-          <a:p>
-            <a:r>
-              <a:rPr lang="pt-BR" dirty="0"/>
-              <a:t>Simulações</a:t>
-            </a:r>
-          </a:p>
-        </p:txBody>
-      </p:sp>
-      <p:sp>
-        <p:nvSpPr>
-          <p:cNvPr id="4" name="Retângulo 3">
-            <a:extLst>
-              <a:ext uri="{FF2B5EF4-FFF2-40B4-BE49-F238E27FC236}">
-                <a16:creationId xmlns:a16="http://schemas.microsoft.com/office/drawing/2014/main" id="{48702720-20B6-0C83-76D4-2C293B89CB5B}"/>
-              </a:ext>
-            </a:extLst>
-          </p:cNvPr>
-          <p:cNvSpPr/>
-          <p:nvPr/>
-        </p:nvSpPr>
-        <p:spPr>
-          <a:xfrm>
-            <a:off x="0" y="1239028"/>
-            <a:ext cx="12192000" cy="586597"/>
-          </a:xfrm>
-          <a:prstGeom prst="rect">
-            <a:avLst/>
-          </a:prstGeom>
-        </p:spPr>
-        <p:style>
-          <a:lnRef idx="2">
-            <a:schemeClr val="accent1">
-              <a:shade val="15000"/>
-            </a:schemeClr>
-          </a:lnRef>
-          <a:fillRef idx="1">
-            <a:schemeClr val="accent1"/>
-          </a:fillRef>
-          <a:effectRef idx="0">
-            <a:schemeClr val="accent1"/>
-          </a:effectRef>
-          <a:fontRef idx="minor">
-            <a:schemeClr val="lt1"/>
-          </a:fontRef>
-        </p:style>
-        <p:txBody>
-          <a:bodyPr rtlCol="0" anchor="ctr"/>
-          <a:lstStyle/>
-          <a:p>
-            <a:pPr algn="ctr"/>
-            <a:endParaRPr lang="pt-BR"/>
-          </a:p>
-        </p:txBody>
-      </p:sp>
-      <p:pic>
-        <p:nvPicPr>
-          <p:cNvPr id="8" name="Imagem 7">
-            <a:extLst>
-              <a:ext uri="{FF2B5EF4-FFF2-40B4-BE49-F238E27FC236}">
-                <a16:creationId xmlns:a16="http://schemas.microsoft.com/office/drawing/2014/main" id="{1306C8C3-04E3-BB07-DA82-599B70188F12}"/>
-              </a:ext>
-            </a:extLst>
-          </p:cNvPr>
-          <p:cNvPicPr>
-            <a:picLocks noChangeAspect="1"/>
-          </p:cNvPicPr>
-          <p:nvPr/>
-        </p:nvPicPr>
-        <p:blipFill>
-          <a:blip r:embed="rId2"/>
-          <a:stretch>
-            <a:fillRect/>
-          </a:stretch>
-        </p:blipFill>
-        <p:spPr>
-          <a:xfrm>
-            <a:off x="5423133" y="2359323"/>
-            <a:ext cx="11" cy="1"/>
-          </a:xfrm>
-          <a:prstGeom prst="rect">
-            <a:avLst/>
-          </a:prstGeom>
-        </p:spPr>
-      </p:pic>
-      <p:pic>
-        <p:nvPicPr>
-          <p:cNvPr id="13" name="Imagem 12">
-            <a:extLst>
-              <a:ext uri="{FF2B5EF4-FFF2-40B4-BE49-F238E27FC236}">
-                <a16:creationId xmlns:a16="http://schemas.microsoft.com/office/drawing/2014/main" id="{0753B1C1-4DCE-4063-CE1C-36D1CE2ABCB7}"/>
-              </a:ext>
-            </a:extLst>
-          </p:cNvPr>
-          <p:cNvPicPr>
-            <a:picLocks noChangeAspect="1"/>
-          </p:cNvPicPr>
-          <p:nvPr/>
-        </p:nvPicPr>
-        <p:blipFill>
-          <a:blip r:embed="rId3"/>
-          <a:stretch>
-            <a:fillRect/>
-          </a:stretch>
-        </p:blipFill>
-        <p:spPr>
-          <a:xfrm>
-            <a:off x="0" y="2564590"/>
-            <a:ext cx="12192000" cy="1127511"/>
-          </a:xfrm>
-          <a:prstGeom prst="rect">
-            <a:avLst/>
-          </a:prstGeom>
-        </p:spPr>
-      </p:pic>
-      <p:sp>
-        <p:nvSpPr>
-          <p:cNvPr id="16" name="CaixaDeTexto 15">
-            <a:extLst>
-              <a:ext uri="{FF2B5EF4-FFF2-40B4-BE49-F238E27FC236}">
-                <a16:creationId xmlns:a16="http://schemas.microsoft.com/office/drawing/2014/main" id="{08A9D24D-2771-9807-CEFE-AED88A66453D}"/>
-              </a:ext>
-            </a:extLst>
-          </p:cNvPr>
-          <p:cNvSpPr txBox="1"/>
-          <p:nvPr/>
-        </p:nvSpPr>
-        <p:spPr>
-          <a:xfrm>
-            <a:off x="222130" y="6133380"/>
-            <a:ext cx="6223958" cy="369332"/>
-          </a:xfrm>
-          <a:prstGeom prst="rect">
-            <a:avLst/>
-          </a:prstGeom>
-          <a:noFill/>
-        </p:spPr>
-        <p:txBody>
-          <a:bodyPr wrap="square">
-            <a:spAutoFit/>
-          </a:bodyPr>
-          <a:lstStyle/>
-          <a:p>
-            <a:r>
-              <a:rPr lang="pt-BR" dirty="0"/>
-              <a:t>Data </a:t>
-            </a:r>
-            <a:r>
-              <a:rPr lang="pt-BR" dirty="0" err="1"/>
-              <a:t>received</a:t>
-            </a:r>
-            <a:r>
-              <a:rPr lang="pt-BR" dirty="0"/>
-              <a:t>: </a:t>
-            </a:r>
-            <a:r>
-              <a:rPr lang="pt-BR" u="sng" dirty="0"/>
-              <a:t>11101111</a:t>
-            </a:r>
-          </a:p>
-        </p:txBody>
-      </p:sp>
-      <p:pic>
-        <p:nvPicPr>
-          <p:cNvPr id="18" name="Imagem 17">
-            <a:extLst>
-              <a:ext uri="{FF2B5EF4-FFF2-40B4-BE49-F238E27FC236}">
-                <a16:creationId xmlns:a16="http://schemas.microsoft.com/office/drawing/2014/main" id="{84D826E6-564B-90B6-343D-3C72DFE9244C}"/>
-              </a:ext>
-            </a:extLst>
-          </p:cNvPr>
-          <p:cNvPicPr>
-            <a:picLocks noChangeAspect="1"/>
-          </p:cNvPicPr>
-          <p:nvPr/>
-        </p:nvPicPr>
-        <p:blipFill>
-          <a:blip r:embed="rId4"/>
-          <a:stretch>
-            <a:fillRect/>
-          </a:stretch>
-        </p:blipFill>
-        <p:spPr>
-          <a:xfrm>
-            <a:off x="0" y="4317795"/>
-            <a:ext cx="12192000" cy="1815585"/>
-          </a:xfrm>
-          <a:prstGeom prst="rect">
-            <a:avLst/>
-          </a:prstGeom>
-        </p:spPr>
-      </p:pic>
-    </p:spTree>
-    <p:extLst>
-      <p:ext uri="{BB962C8B-B14F-4D97-AF65-F5344CB8AC3E}">
-        <p14:creationId xmlns:p14="http://schemas.microsoft.com/office/powerpoint/2010/main" val="4224344838"/>
-      </p:ext>
-    </p:extLst>
-  </p:cSld>
-  <p:clrMapOvr>
-    <a:masterClrMapping/>
-  </p:clrMapOvr>
-</p:sld>
-</file>
-
-<file path=ppt/slides/slide9.xml><?xml version="1.0" encoding="utf-8"?>
-<p:sld xmlns:a="http://schemas.openxmlformats.org/drawingml/2006/main" xmlns:r="http://schemas.openxmlformats.org/officeDocument/2006/relationships" xmlns:p="http://schemas.openxmlformats.org/presentationml/2006/main">
-  <p:cSld>
-    <p:spTree>
-      <p:nvGrpSpPr>
-        <p:cNvPr id="1" name=""/>
-        <p:cNvGrpSpPr/>
-        <p:nvPr/>
-      </p:nvGrpSpPr>
-      <p:grpSpPr>
-        <a:xfrm>
-          <a:off x="0" y="0"/>
-          <a:ext cx="0" cy="0"/>
-          <a:chOff x="0" y="0"/>
-          <a:chExt cx="0" cy="0"/>
-        </a:xfrm>
-      </p:grpSpPr>
-      <p:sp>
-        <p:nvSpPr>
-          <p:cNvPr id="2" name="Título 1">
-            <a:extLst>
-              <a:ext uri="{FF2B5EF4-FFF2-40B4-BE49-F238E27FC236}">
-                <a16:creationId xmlns:a16="http://schemas.microsoft.com/office/drawing/2014/main" id="{2082E712-2FB6-C519-58E5-190048E67FD7}"/>
-              </a:ext>
-            </a:extLst>
-          </p:cNvPr>
-          <p:cNvSpPr>
-            <a:spLocks noGrp="1"/>
-          </p:cNvSpPr>
-          <p:nvPr>
-            <p:ph type="title"/>
-          </p:nvPr>
-        </p:nvSpPr>
-        <p:spPr>
-          <a:xfrm>
-            <a:off x="0" y="18255"/>
-            <a:ext cx="10515600" cy="1325563"/>
-          </a:xfrm>
-        </p:spPr>
-        <p:txBody>
-          <a:bodyPr/>
-          <a:lstStyle/>
-          <a:p>
-            <a:r>
-              <a:rPr lang="pt-BR" dirty="0"/>
-              <a:t>Sintetização/Implementação</a:t>
-            </a:r>
-          </a:p>
-        </p:txBody>
-      </p:sp>
-      <p:sp>
-        <p:nvSpPr>
-          <p:cNvPr id="4" name="Retângulo 3">
-            <a:extLst>
-              <a:ext uri="{FF2B5EF4-FFF2-40B4-BE49-F238E27FC236}">
-                <a16:creationId xmlns:a16="http://schemas.microsoft.com/office/drawing/2014/main" id="{48702720-20B6-0C83-76D4-2C293B89CB5B}"/>
-              </a:ext>
-            </a:extLst>
-          </p:cNvPr>
-          <p:cNvSpPr/>
-          <p:nvPr/>
-        </p:nvSpPr>
-        <p:spPr>
-          <a:xfrm>
-            <a:off x="0" y="1239028"/>
-            <a:ext cx="12192000" cy="586597"/>
-          </a:xfrm>
-          <a:prstGeom prst="rect">
-            <a:avLst/>
-          </a:prstGeom>
-        </p:spPr>
-        <p:style>
-          <a:lnRef idx="2">
-            <a:schemeClr val="accent1">
-              <a:shade val="15000"/>
-            </a:schemeClr>
-          </a:lnRef>
-          <a:fillRef idx="1">
-            <a:schemeClr val="accent1"/>
-          </a:fillRef>
-          <a:effectRef idx="0">
-            <a:schemeClr val="accent1"/>
-          </a:effectRef>
-          <a:fontRef idx="minor">
-            <a:schemeClr val="lt1"/>
-          </a:fontRef>
-        </p:style>
-        <p:txBody>
-          <a:bodyPr rtlCol="0" anchor="ctr"/>
-          <a:lstStyle/>
-          <a:p>
-            <a:pPr algn="ctr"/>
-            <a:endParaRPr lang="pt-BR"/>
-          </a:p>
-        </p:txBody>
-      </p:sp>
-      <p:pic>
-        <p:nvPicPr>
-          <p:cNvPr id="8" name="Imagem 7">
-            <a:extLst>
-              <a:ext uri="{FF2B5EF4-FFF2-40B4-BE49-F238E27FC236}">
-                <a16:creationId xmlns:a16="http://schemas.microsoft.com/office/drawing/2014/main" id="{3296BB7B-9816-9EA1-364A-EEC638C2DE03}"/>
-              </a:ext>
-            </a:extLst>
-          </p:cNvPr>
-          <p:cNvPicPr>
-            <a:picLocks noChangeAspect="1"/>
-          </p:cNvPicPr>
-          <p:nvPr/>
-        </p:nvPicPr>
-        <p:blipFill>
-          <a:blip r:embed="rId2"/>
-          <a:stretch>
-            <a:fillRect/>
-          </a:stretch>
-        </p:blipFill>
-        <p:spPr>
-          <a:xfrm>
-            <a:off x="286363" y="2030652"/>
-            <a:ext cx="4484563" cy="4151073"/>
-          </a:xfrm>
-          <a:prstGeom prst="rect">
-            <a:avLst/>
-          </a:prstGeom>
-        </p:spPr>
-      </p:pic>
-      <p:pic>
-        <p:nvPicPr>
-          <p:cNvPr id="10" name="Imagem 9">
-            <a:extLst>
-              <a:ext uri="{FF2B5EF4-FFF2-40B4-BE49-F238E27FC236}">
-                <a16:creationId xmlns:a16="http://schemas.microsoft.com/office/drawing/2014/main" id="{7DECC40D-3C9B-B651-3A49-9BDDFDD3D6AF}"/>
-              </a:ext>
-            </a:extLst>
-          </p:cNvPr>
-          <p:cNvPicPr>
-            <a:picLocks noChangeAspect="1"/>
-          </p:cNvPicPr>
-          <p:nvPr/>
-        </p:nvPicPr>
-        <p:blipFill>
-          <a:blip r:embed="rId3"/>
-          <a:stretch>
-            <a:fillRect/>
-          </a:stretch>
-        </p:blipFill>
-        <p:spPr>
-          <a:xfrm>
-            <a:off x="5186241" y="3644267"/>
-            <a:ext cx="2476846" cy="1124107"/>
-          </a:xfrm>
-          <a:prstGeom prst="rect">
-            <a:avLst/>
-          </a:prstGeom>
-        </p:spPr>
-      </p:pic>
-      <p:sp>
-        <p:nvSpPr>
-          <p:cNvPr id="11" name="Espaço Reservado para Conteúdo 2">
-            <a:extLst>
-              <a:ext uri="{FF2B5EF4-FFF2-40B4-BE49-F238E27FC236}">
-                <a16:creationId xmlns:a16="http://schemas.microsoft.com/office/drawing/2014/main" id="{44114601-69B9-144D-A18F-9248A8BCEBA3}"/>
-              </a:ext>
-            </a:extLst>
-          </p:cNvPr>
-          <p:cNvSpPr>
-            <a:spLocks noGrp="1"/>
-          </p:cNvSpPr>
-          <p:nvPr>
-            <p:ph idx="1"/>
-          </p:nvPr>
-        </p:nvSpPr>
-        <p:spPr>
-          <a:xfrm>
-            <a:off x="8464550" y="2034384"/>
-            <a:ext cx="4102100" cy="4351338"/>
-          </a:xfrm>
-        </p:spPr>
-        <p:txBody>
-          <a:bodyPr/>
-          <a:lstStyle/>
-          <a:p>
-            <a:r>
-              <a:rPr lang="pt-BR" dirty="0" err="1"/>
-              <a:t>Mux</a:t>
-            </a:r>
-            <a:r>
-              <a:rPr lang="pt-BR" dirty="0"/>
-              <a:t> + Registradores</a:t>
-            </a:r>
-          </a:p>
-        </p:txBody>
-      </p:sp>
-      <p:pic>
-        <p:nvPicPr>
-          <p:cNvPr id="13" name="Imagem 12">
-            <a:extLst>
-              <a:ext uri="{FF2B5EF4-FFF2-40B4-BE49-F238E27FC236}">
-                <a16:creationId xmlns:a16="http://schemas.microsoft.com/office/drawing/2014/main" id="{0ABCB69C-D28F-CF54-4020-54BCD05C1998}"/>
-              </a:ext>
-            </a:extLst>
-          </p:cNvPr>
-          <p:cNvPicPr>
-            <a:picLocks noChangeAspect="1"/>
-          </p:cNvPicPr>
-          <p:nvPr/>
-        </p:nvPicPr>
-        <p:blipFill>
-          <a:blip r:embed="rId4"/>
-          <a:stretch>
-            <a:fillRect/>
-          </a:stretch>
-        </p:blipFill>
-        <p:spPr>
-          <a:xfrm>
-            <a:off x="8393362" y="2747723"/>
-            <a:ext cx="3229790" cy="3053242"/>
-          </a:xfrm>
-          <a:prstGeom prst="rect">
-            <a:avLst/>
-          </a:prstGeom>
-        </p:spPr>
-      </p:pic>
-    </p:spTree>
-    <p:extLst>
-      <p:ext uri="{BB962C8B-B14F-4D97-AF65-F5344CB8AC3E}">
-        <p14:creationId xmlns:p14="http://schemas.microsoft.com/office/powerpoint/2010/main" val="3668001289"/>
+        <p14:creationId xmlns:p14="http://schemas.microsoft.com/office/powerpoint/2010/main" val="3343184316"/>
       </p:ext>
     </p:extLst>
   </p:cSld>

</xml_diff>